<commit_message>
Alternative versione of DD ppt
</commit_message>
<xml_diff>
--- a/OtherStuff/DD final presentation 16_9.pptx
+++ b/OtherStuff/DD final presentation 16_9.pptx
@@ -319,7 +319,7 @@
           <a:p>
             <a:fld id="{8CA51A76-FB94-4D77-AD27-C72DA743A03F}" type="datetimeFigureOut">
               <a:rPr lang="it-IT" smtClean="0"/>
-              <a:t>07/12/2015</a:t>
+              <a:t>08/12/2015</a:t>
             </a:fld>
             <a:endParaRPr lang="it-IT"/>
           </a:p>
@@ -484,7 +484,7 @@
           <a:p>
             <a:fld id="{8CA51A76-FB94-4D77-AD27-C72DA743A03F}" type="datetimeFigureOut">
               <a:rPr lang="it-IT" smtClean="0"/>
-              <a:t>07/12/2015</a:t>
+              <a:t>08/12/2015</a:t>
             </a:fld>
             <a:endParaRPr lang="it-IT"/>
           </a:p>
@@ -659,7 +659,7 @@
           <a:p>
             <a:fld id="{8CA51A76-FB94-4D77-AD27-C72DA743A03F}" type="datetimeFigureOut">
               <a:rPr lang="it-IT" smtClean="0"/>
-              <a:t>07/12/2015</a:t>
+              <a:t>08/12/2015</a:t>
             </a:fld>
             <a:endParaRPr lang="it-IT"/>
           </a:p>
@@ -824,7 +824,7 @@
           <a:p>
             <a:fld id="{8CA51A76-FB94-4D77-AD27-C72DA743A03F}" type="datetimeFigureOut">
               <a:rPr lang="it-IT" smtClean="0"/>
-              <a:t>07/12/2015</a:t>
+              <a:t>08/12/2015</a:t>
             </a:fld>
             <a:endParaRPr lang="it-IT"/>
           </a:p>
@@ -1066,7 +1066,7 @@
           <a:p>
             <a:fld id="{8CA51A76-FB94-4D77-AD27-C72DA743A03F}" type="datetimeFigureOut">
               <a:rPr lang="it-IT" smtClean="0"/>
-              <a:t>07/12/2015</a:t>
+              <a:t>08/12/2015</a:t>
             </a:fld>
             <a:endParaRPr lang="it-IT"/>
           </a:p>
@@ -1330,7 +1330,7 @@
           <a:p>
             <a:fld id="{8CA51A76-FB94-4D77-AD27-C72DA743A03F}" type="datetimeFigureOut">
               <a:rPr lang="it-IT" smtClean="0"/>
-              <a:t>07/12/2015</a:t>
+              <a:t>08/12/2015</a:t>
             </a:fld>
             <a:endParaRPr lang="it-IT"/>
           </a:p>
@@ -1708,7 +1708,7 @@
           <a:p>
             <a:fld id="{8CA51A76-FB94-4D77-AD27-C72DA743A03F}" type="datetimeFigureOut">
               <a:rPr lang="it-IT" smtClean="0"/>
-              <a:t>07/12/2015</a:t>
+              <a:t>08/12/2015</a:t>
             </a:fld>
             <a:endParaRPr lang="it-IT"/>
           </a:p>
@@ -1858,7 +1858,7 @@
           <a:p>
             <a:fld id="{8CA51A76-FB94-4D77-AD27-C72DA743A03F}" type="datetimeFigureOut">
               <a:rPr lang="it-IT" smtClean="0"/>
-              <a:t>07/12/2015</a:t>
+              <a:t>08/12/2015</a:t>
             </a:fld>
             <a:endParaRPr lang="it-IT"/>
           </a:p>
@@ -1948,7 +1948,7 @@
           <a:p>
             <a:fld id="{8CA51A76-FB94-4D77-AD27-C72DA743A03F}" type="datetimeFigureOut">
               <a:rPr lang="it-IT" smtClean="0"/>
-              <a:t>07/12/2015</a:t>
+              <a:t>08/12/2015</a:t>
             </a:fld>
             <a:endParaRPr lang="it-IT"/>
           </a:p>
@@ -2209,7 +2209,7 @@
           <a:p>
             <a:fld id="{8CA51A76-FB94-4D77-AD27-C72DA743A03F}" type="datetimeFigureOut">
               <a:rPr lang="it-IT" smtClean="0"/>
-              <a:t>07/12/2015</a:t>
+              <a:t>08/12/2015</a:t>
             </a:fld>
             <a:endParaRPr lang="it-IT"/>
           </a:p>
@@ -2497,7 +2497,7 @@
           <a:p>
             <a:fld id="{8CA51A76-FB94-4D77-AD27-C72DA743A03F}" type="datetimeFigureOut">
               <a:rPr lang="it-IT" smtClean="0"/>
-              <a:t>07/12/2015</a:t>
+              <a:t>08/12/2015</a:t>
             </a:fld>
             <a:endParaRPr lang="it-IT"/>
           </a:p>
@@ -3268,7 +3268,7 @@
           <a:p>
             <a:fld id="{8CA51A76-FB94-4D77-AD27-C72DA743A03F}" type="datetimeFigureOut">
               <a:rPr lang="it-IT" smtClean="0"/>
-              <a:t>07/12/2015</a:t>
+              <a:t>08/12/2015</a:t>
             </a:fld>
             <a:endParaRPr lang="it-IT"/>
           </a:p>
@@ -16336,15 +16336,15 @@
         </p:spPr>
         <p:style>
           <a:lnRef idx="2">
-            <a:schemeClr val="accent5">
+            <a:schemeClr val="accent2">
               <a:shade val="50000"/>
             </a:schemeClr>
           </a:lnRef>
           <a:fillRef idx="1">
-            <a:schemeClr val="accent5"/>
+            <a:schemeClr val="accent2"/>
           </a:fillRef>
           <a:effectRef idx="0">
-            <a:schemeClr val="accent5"/>
+            <a:schemeClr val="accent2"/>
           </a:effectRef>
           <a:fontRef idx="minor">
             <a:schemeClr val="lt1"/>
@@ -16391,6 +16391,14 @@
           <a:prstGeom prst="star12">
             <a:avLst/>
           </a:prstGeom>
+          <a:solidFill>
+            <a:srgbClr val="DA5D00"/>
+          </a:solidFill>
+          <a:ln>
+            <a:solidFill>
+              <a:srgbClr val="DA5D00"/>
+            </a:solidFill>
+          </a:ln>
         </p:spPr>
         <p:style>
           <a:lnRef idx="2">
@@ -16551,13 +16559,7 @@
               <a:rPr lang="en-US" sz="4000" b="1" dirty="0" smtClean="0">
                 <a:latin typeface="Cambria" panose="02040503050406030204" pitchFamily="18" charset="0"/>
               </a:rPr>
-              <a:t>Event-based </a:t>
-            </a:r>
-            <a:r>
-              <a:rPr lang="en-US" sz="4000" b="1" dirty="0" smtClean="0">
-                <a:latin typeface="Cambria" panose="02040503050406030204" pitchFamily="18" charset="0"/>
-              </a:rPr>
-              <a:t>architecture</a:t>
+              <a:t>Event-based architecture</a:t>
             </a:r>
             <a:endParaRPr lang="en-US" sz="4000" dirty="0"/>
           </a:p>
@@ -17035,11 +17037,14 @@
           <a:p>
             <a:pPr algn="ctr"/>
             <a:r>
-              <a:rPr lang="en-US" sz="1350" dirty="0">
-                <a:latin typeface="Cambria" panose="02040503050406030204" pitchFamily="18" charset="0"/>
-              </a:rPr>
-              <a:t>MESSAGE BROKER</a:t>
-            </a:r>
+              <a:rPr lang="en-US" sz="1350" dirty="0" smtClean="0">
+                <a:latin typeface="Cambria" panose="02040503050406030204" pitchFamily="18" charset="0"/>
+              </a:rPr>
+              <a:t>BROKER</a:t>
+            </a:r>
+            <a:endParaRPr lang="en-US" sz="1350" dirty="0">
+              <a:latin typeface="Cambria" panose="02040503050406030204" pitchFamily="18" charset="0"/>
+            </a:endParaRPr>
           </a:p>
         </p:txBody>
       </p:sp>

</xml_diff>